<commit_message>
La inn referanser i presentasjonen
</commit_message>
<xml_diff>
--- a/Foredrag Bouvet - Inversion of Control.pptx
+++ b/Foredrag Bouvet - Inversion of Control.pptx
@@ -5,10 +5,10 @@
     <p:sldMasterId id="2147483648" r:id="rId1"/>
   </p:sldMasterIdLst>
   <p:notesMasterIdLst>
-    <p:notesMasterId r:id="rId13"/>
+    <p:notesMasterId r:id="rId14"/>
   </p:notesMasterIdLst>
   <p:handoutMasterIdLst>
-    <p:handoutMasterId r:id="rId14"/>
+    <p:handoutMasterId r:id="rId15"/>
   </p:handoutMasterIdLst>
   <p:sldIdLst>
     <p:sldId id="256" r:id="rId2"/>
@@ -22,6 +22,7 @@
     <p:sldId id="265" r:id="rId10"/>
     <p:sldId id="266" r:id="rId11"/>
     <p:sldId id="260" r:id="rId12"/>
+    <p:sldId id="267" r:id="rId13"/>
   </p:sldIdLst>
   <p:sldSz cx="9144000" cy="6858000" type="screen4x3"/>
   <p:notesSz cx="6858000" cy="9144000"/>
@@ -4439,16 +4440,6 @@
           <a:p>
             <a:r>
               <a:rPr lang="nb-NO" dirty="0" err="1" smtClean="0"/>
-              <a:t>Spring.Net</a:t>
-            </a:r>
-            <a:r>
-              <a:rPr lang="nb-NO" dirty="0" smtClean="0"/>
-              <a:t> (Java)</a:t>
-            </a:r>
-          </a:p>
-          <a:p>
-            <a:r>
-              <a:rPr lang="nb-NO" dirty="0" err="1" smtClean="0"/>
               <a:t>Autofac</a:t>
             </a:r>
             <a:endParaRPr lang="nb-NO" dirty="0" smtClean="0"/>
@@ -4468,12 +4459,26 @@
           </a:p>
           <a:p>
             <a:r>
+              <a:rPr lang="nb-NO" dirty="0" err="1"/>
+              <a:t>Spring.Net</a:t>
+            </a:r>
+            <a:r>
+              <a:rPr lang="nb-NO" dirty="0"/>
+              <a:t> (Java)</a:t>
+            </a:r>
+          </a:p>
+          <a:p>
+            <a:r>
               <a:rPr lang="nb-NO" dirty="0" err="1" smtClean="0"/>
               <a:t>PicoContainer.Net</a:t>
             </a:r>
             <a:r>
               <a:rPr lang="nb-NO" dirty="0" smtClean="0"/>
-              <a:t> (Java)</a:t>
+              <a:t> </a:t>
+            </a:r>
+            <a:r>
+              <a:rPr lang="nb-NO" dirty="0" smtClean="0"/>
+              <a:t>(Java)</a:t>
             </a:r>
           </a:p>
         </p:txBody>
@@ -4482,6 +4487,166 @@
     <p:extLst>
       <p:ext uri="{BB962C8B-B14F-4D97-AF65-F5344CB8AC3E}">
         <p14:creationId xmlns:p14="http://schemas.microsoft.com/office/powerpoint/2010/main" val="3940462286"/>
+      </p:ext>
+    </p:extLst>
+  </p:cSld>
+  <p:clrMapOvr>
+    <a:masterClrMapping/>
+  </p:clrMapOvr>
+</p:sld>
+</file>
+
+<file path=ppt/slides/slide12.xml><?xml version="1.0" encoding="utf-8"?>
+<p:sld xmlns:a="http://schemas.openxmlformats.org/drawingml/2006/main" xmlns:r="http://schemas.openxmlformats.org/officeDocument/2006/relationships" xmlns:p="http://schemas.openxmlformats.org/presentationml/2006/main">
+  <p:cSld>
+    <p:spTree>
+      <p:nvGrpSpPr>
+        <p:cNvPr id="1" name=""/>
+        <p:cNvGrpSpPr/>
+        <p:nvPr/>
+      </p:nvGrpSpPr>
+      <p:grpSpPr>
+        <a:xfrm>
+          <a:off x="0" y="0"/>
+          <a:ext cx="0" cy="0"/>
+          <a:chOff x="0" y="0"/>
+          <a:chExt cx="0" cy="0"/>
+        </a:xfrm>
+      </p:grpSpPr>
+      <p:sp>
+        <p:nvSpPr>
+          <p:cNvPr id="2" name="Rektangel 1"/>
+          <p:cNvSpPr/>
+          <p:nvPr/>
+        </p:nvSpPr>
+        <p:spPr>
+          <a:xfrm>
+            <a:off x="2113991" y="5445224"/>
+            <a:ext cx="5166320" cy="369332"/>
+          </a:xfrm>
+          <a:prstGeom prst="rect">
+            <a:avLst/>
+          </a:prstGeom>
+        </p:spPr>
+        <p:txBody>
+          <a:bodyPr wrap="square">
+            <a:spAutoFit/>
+          </a:bodyPr>
+          <a:lstStyle/>
+          <a:p>
+            <a:r>
+              <a:rPr lang="nb-NO" dirty="0" err="1"/>
+              <a:t>git@github.com:VirtueMe</a:t>
+            </a:r>
+            <a:r>
+              <a:rPr lang="nb-NO" dirty="0"/>
+              <a:t>/</a:t>
+            </a:r>
+            <a:r>
+              <a:rPr lang="nb-NO" dirty="0" err="1"/>
+              <a:t>BouvetIoCPresentasjon.git</a:t>
+            </a:r>
+            <a:endParaRPr lang="nb-NO" dirty="0"/>
+          </a:p>
+        </p:txBody>
+      </p:sp>
+      <p:sp>
+        <p:nvSpPr>
+          <p:cNvPr id="3" name="Rektangel 2"/>
+          <p:cNvSpPr/>
+          <p:nvPr/>
+        </p:nvSpPr>
+        <p:spPr>
+          <a:xfrm>
+            <a:off x="1907704" y="1412776"/>
+            <a:ext cx="5598368" cy="369332"/>
+          </a:xfrm>
+          <a:prstGeom prst="rect">
+            <a:avLst/>
+          </a:prstGeom>
+        </p:spPr>
+        <p:txBody>
+          <a:bodyPr wrap="square">
+            <a:spAutoFit/>
+          </a:bodyPr>
+          <a:lstStyle/>
+          <a:p>
+            <a:r>
+              <a:rPr lang="nb-NO" dirty="0">
+                <a:hlinkClick r:id="rId2"/>
+              </a:rPr>
+              <a:t>http://www.objectmentor.com/resources/articles/dip.pdf</a:t>
+            </a:r>
+            <a:endParaRPr lang="nb-NO" dirty="0"/>
+          </a:p>
+        </p:txBody>
+      </p:sp>
+      <p:sp>
+        <p:nvSpPr>
+          <p:cNvPr id="4" name="Rektangel 3"/>
+          <p:cNvSpPr/>
+          <p:nvPr/>
+        </p:nvSpPr>
+        <p:spPr>
+          <a:xfrm>
+            <a:off x="2190665" y="2492896"/>
+            <a:ext cx="5012973" cy="369332"/>
+          </a:xfrm>
+          <a:prstGeom prst="rect">
+            <a:avLst/>
+          </a:prstGeom>
+        </p:spPr>
+        <p:txBody>
+          <a:bodyPr wrap="square">
+            <a:spAutoFit/>
+          </a:bodyPr>
+          <a:lstStyle/>
+          <a:p>
+            <a:r>
+              <a:rPr lang="nb-NO" dirty="0">
+                <a:hlinkClick r:id="rId3"/>
+              </a:rPr>
+              <a:t>http://en.wikipedia.org/wiki/Dependency_injection</a:t>
+            </a:r>
+            <a:endParaRPr lang="nb-NO" dirty="0"/>
+          </a:p>
+        </p:txBody>
+      </p:sp>
+      <p:sp>
+        <p:nvSpPr>
+          <p:cNvPr id="5" name="Rektangel 4"/>
+          <p:cNvSpPr/>
+          <p:nvPr/>
+        </p:nvSpPr>
+        <p:spPr>
+          <a:xfrm>
+            <a:off x="2354274" y="1979548"/>
+            <a:ext cx="4685753" cy="369332"/>
+          </a:xfrm>
+          <a:prstGeom prst="rect">
+            <a:avLst/>
+          </a:prstGeom>
+        </p:spPr>
+        <p:txBody>
+          <a:bodyPr wrap="square">
+            <a:spAutoFit/>
+          </a:bodyPr>
+          <a:lstStyle/>
+          <a:p>
+            <a:r>
+              <a:rPr lang="nb-NO" dirty="0">
+                <a:hlinkClick r:id="rId4"/>
+              </a:rPr>
+              <a:t>http://martinfowler.com/articles/injection.html</a:t>
+            </a:r>
+            <a:endParaRPr lang="nb-NO" dirty="0"/>
+          </a:p>
+        </p:txBody>
+      </p:sp>
+    </p:spTree>
+    <p:extLst>
+      <p:ext uri="{BB962C8B-B14F-4D97-AF65-F5344CB8AC3E}">
+        <p14:creationId xmlns:p14="http://schemas.microsoft.com/office/powerpoint/2010/main" val="3452127570"/>
       </p:ext>
     </p:extLst>
   </p:cSld>

</xml_diff>